<commit_message>
adjusted collision detection (now working correctly with smaller timestep), added final paper writeup (almost complete)
</commit_message>
<xml_diff>
--- a/Final_Presentation.pptx
+++ b/Final_Presentation.pptx
@@ -3706,7 +3706,11 @@
             <a:pPr algn="r"/>
             <a:r>
               <a:rPr lang="en-US" sz="6000" dirty="0" smtClean="0"/>
-              <a:t>PROJECTION BASED DYNAMICS</a:t>
+              <a:t>PROJECTIVE </a:t>
+            </a:r>
+            <a:r>
+              <a:rPr lang="en-US" sz="6000" dirty="0" smtClean="0"/>
+              <a:t>DYNAMICS</a:t>
             </a:r>
             <a:r>
               <a:rPr lang="en-US" sz="5400" dirty="0" smtClean="0"/>
@@ -3750,10 +3754,10 @@
             </a:r>
             <a:r>
               <a:rPr lang="en-US" sz="3200" dirty="0" err="1" smtClean="0"/>
-              <a:t>Huerin</a:t>
-            </a:r>
-            <a:r>
-              <a:rPr lang="en-US" sz="3200" dirty="0"/>
+              <a:t>HueLin</a:t>
+            </a:r>
+            <a:r>
+              <a:rPr lang="en-US" sz="3200" dirty="0" smtClean="0"/>
               <a:t> </a:t>
             </a:r>
             <a:r>
@@ -3805,11 +3809,11 @@
   <p:clrMapOvr>
     <a:masterClrMapping/>
   </p:clrMapOvr>
-  <mc:AlternateContent xmlns:mc="http://schemas.openxmlformats.org/markup-compatibility/2006">
-    <mc:Choice xmlns:p14="http://schemas.microsoft.com/office/powerpoint/2010/main" Requires="p14">
+  <mc:AlternateContent xmlns:mc="http://schemas.openxmlformats.org/markup-compatibility/2006" xmlns:p14="http://schemas.microsoft.com/office/powerpoint/2010/main">
+    <mc:Choice Requires="p14">
       <p:transition spd="slow" p14:dur="2000"/>
     </mc:Choice>
-    <mc:Fallback>
+    <mc:Fallback xmlns="">
       <p:transition spd="slow"/>
     </mc:Fallback>
   </mc:AlternateContent>
@@ -4004,31 +4008,41 @@
             <a:pPr algn="ctr"/>
             <a:r>
               <a:rPr lang="en-US" dirty="0" smtClean="0"/>
-              <a:t>RENDERED RESULTS</a:t>
+              <a:t>LIVE DEMO</a:t>
             </a:r>
             <a:endParaRPr lang="en-US" dirty="0"/>
           </a:p>
         </p:txBody>
       </p:sp>
-      <p:sp>
-        <p:nvSpPr>
-          <p:cNvPr id="3" name="Content Placeholder 2"/>
-          <p:cNvSpPr>
-            <a:spLocks noGrp="1"/>
-          </p:cNvSpPr>
+      <p:pic>
+        <p:nvPicPr>
+          <p:cNvPr id="4" name="Content Placeholder 3"/>
+          <p:cNvPicPr>
+            <a:picLocks noGrp="1" noChangeAspect="1"/>
+          </p:cNvPicPr>
           <p:nvPr>
             <p:ph sz="quarter" idx="1"/>
           </p:nvPr>
-        </p:nvSpPr>
-        <p:spPr/>
-        <p:txBody>
-          <a:bodyPr/>
-          <a:lstStyle/>
-          <a:p>
-            <a:endParaRPr lang="en-US"/>
-          </a:p>
-        </p:txBody>
-      </p:sp>
+        </p:nvPicPr>
+        <p:blipFill>
+          <a:blip r:embed="rId2">
+            <a:extLst>
+              <a:ext uri="{28A0092B-C50C-407E-A947-70E740481C1C}">
+                <a14:useLocalDpi xmlns:a14="http://schemas.microsoft.com/office/drawing/2010/main" val="0"/>
+              </a:ext>
+            </a:extLst>
+          </a:blip>
+          <a:stretch>
+            <a:fillRect/>
+          </a:stretch>
+        </p:blipFill>
+        <p:spPr>
+          <a:xfrm>
+            <a:off x="1185269" y="1828800"/>
+            <a:ext cx="7044331" cy="4495800"/>
+          </a:xfrm>
+        </p:spPr>
+      </p:pic>
     </p:spTree>
     <p:extLst>
       <p:ext uri="{BB962C8B-B14F-4D97-AF65-F5344CB8AC3E}">
@@ -4099,20 +4113,31 @@
           <a:lstStyle/>
           <a:p>
             <a:r>
+              <a:rPr lang="en-US" dirty="0"/>
+              <a:t>Handle volume preservation using tetrahedral constraints</a:t>
+            </a:r>
+          </a:p>
+          <a:p>
+            <a:r>
               <a:rPr lang="en-US" dirty="0" smtClean="0"/>
-              <a:t>Improve runtime even further</a:t>
+              <a:t>Improve runtime</a:t>
             </a:r>
           </a:p>
           <a:p>
             <a:r>
               <a:rPr lang="en-US" dirty="0" smtClean="0"/>
-              <a:t>Handle volume preservation using tetrahedral constraints</a:t>
-            </a:r>
+              <a:t>Handle collisions – in progress</a:t>
+            </a:r>
+            <a:endParaRPr lang="en-US" dirty="0" smtClean="0"/>
           </a:p>
           <a:p>
             <a:r>
               <a:rPr lang="en-US" dirty="0" smtClean="0"/>
-              <a:t>Self-collisions and mesh-mesh intersections</a:t>
+              <a:t>Self-collisions </a:t>
+            </a:r>
+            <a:r>
+              <a:rPr lang="en-US" dirty="0" smtClean="0"/>
+              <a:t>and mesh-mesh intersections</a:t>
             </a:r>
           </a:p>
           <a:p>

</xml_diff>